<commit_message>
last update as of 12/10
</commit_message>
<xml_diff>
--- a/03-Supports/Projet 5 - Presentation V1.1 (2509).pptx
+++ b/03-Supports/Projet 5 - Presentation V1.1 (2509).pptx
@@ -236,7 +236,7 @@
           <a:p>
             <a:fld id="{41658A34-83F4-4B2E-BC5A-DE51EE8822F9}" type="datetimeFigureOut">
               <a:rPr lang="en-US" smtClean="0"/>
-              <a:t>9/17/2018</a:t>
+              <a:t>10/4/2018</a:t>
             </a:fld>
             <a:endParaRPr lang="en-US"/>
           </a:p>
@@ -401,7 +401,7 @@
           <a:p>
             <a:fld id="{7F2E1917-0BAF-4687-978A-82FFF05559C3}" type="datetimeFigureOut">
               <a:rPr lang="en-US" smtClean="0"/>
-              <a:t>9/17/2018</a:t>
+              <a:t>10/4/2018</a:t>
             </a:fld>
             <a:endParaRPr lang="en-US"/>
           </a:p>
@@ -894,7 +894,7 @@
           <a:p>
             <a:fld id="{AFC1F78A-3D78-4BCD-8BEC-9BC44BBF9BD8}" type="datetime1">
               <a:rPr lang="fr-FR" smtClean="0"/>
-              <a:t>27/09/2018</a:t>
+              <a:t>04/10/2018</a:t>
             </a:fld>
             <a:endParaRPr lang="en-US"/>
           </a:p>
@@ -1118,7 +1118,7 @@
           <a:p>
             <a:fld id="{AAC300B0-B286-44DF-8A53-BDDE487DDE35}" type="datetime1">
               <a:rPr lang="fr-FR" smtClean="0"/>
-              <a:t>27/09/2018</a:t>
+              <a:t>04/10/2018</a:t>
             </a:fld>
             <a:endParaRPr lang="en-US"/>
           </a:p>
@@ -1390,7 +1390,7 @@
           <a:p>
             <a:fld id="{E900F25D-3788-42DB-9777-277D8E414BA5}" type="datetime1">
               <a:rPr lang="fr-FR" smtClean="0"/>
-              <a:t>27/09/2018</a:t>
+              <a:t>04/10/2018</a:t>
             </a:fld>
             <a:endParaRPr lang="en-US"/>
           </a:p>
@@ -1661,7 +1661,7 @@
           <a:p>
             <a:fld id="{8E3B569D-DE1E-4323-806D-38025BE0B08B}" type="datetime1">
               <a:rPr lang="fr-FR" smtClean="0"/>
-              <a:t>27/09/2018</a:t>
+              <a:t>04/10/2018</a:t>
             </a:fld>
             <a:endParaRPr lang="en-US"/>
           </a:p>
@@ -1851,7 +1851,7 @@
           <a:p>
             <a:fld id="{1E0D3295-F3DE-4742-A5DF-5E269C5A3909}" type="datetime1">
               <a:rPr lang="fr-FR" smtClean="0"/>
-              <a:t>27/09/2018</a:t>
+              <a:t>04/10/2018</a:t>
             </a:fld>
             <a:endParaRPr lang="en-US"/>
           </a:p>
@@ -2210,7 +2210,7 @@
           <a:p>
             <a:fld id="{1AEA8C6F-E409-4F7E-91B2-59713AE3871F}" type="datetime1">
               <a:rPr lang="fr-FR" smtClean="0"/>
-              <a:t>27/09/2018</a:t>
+              <a:t>04/10/2018</a:t>
             </a:fld>
             <a:endParaRPr lang="en-US"/>
           </a:p>
@@ -2501,7 +2501,7 @@
           <a:p>
             <a:fld id="{A70BA5B2-9888-47E6-92C7-08276D457C80}" type="datetime1">
               <a:rPr lang="fr-FR" smtClean="0"/>
-              <a:t>27/09/2018</a:t>
+              <a:t>04/10/2018</a:t>
             </a:fld>
             <a:endParaRPr lang="en-US"/>
           </a:p>
@@ -2896,7 +2896,7 @@
           <a:p>
             <a:fld id="{53091535-269B-4262-A803-4F880E93D057}" type="datetime1">
               <a:rPr lang="fr-FR" smtClean="0"/>
-              <a:t>27/09/2018</a:t>
+              <a:t>04/10/2018</a:t>
             </a:fld>
             <a:endParaRPr lang="en-US"/>
           </a:p>
@@ -3030,7 +3030,7 @@
           <a:p>
             <a:fld id="{536718AE-B66E-4E14-B08C-7602AE553C67}" type="datetime1">
               <a:rPr lang="fr-FR" smtClean="0"/>
-              <a:t>27/09/2018</a:t>
+              <a:t>04/10/2018</a:t>
             </a:fld>
             <a:endParaRPr lang="en-US"/>
           </a:p>
@@ -3217,7 +3217,7 @@
           <a:p>
             <a:fld id="{1BBE5E5A-1056-4872-8155-955DE08B0AE3}" type="datetime1">
               <a:rPr lang="fr-FR" smtClean="0"/>
-              <a:t>27/09/2018</a:t>
+              <a:t>04/10/2018</a:t>
             </a:fld>
             <a:endParaRPr lang="en-US"/>
           </a:p>
@@ -3587,7 +3587,7 @@
           <a:p>
             <a:fld id="{6E777EE0-D6C0-47E9-8BD6-F07A776A6C10}" type="datetime1">
               <a:rPr lang="fr-FR" smtClean="0"/>
-              <a:t>27/09/2018</a:t>
+              <a:t>04/10/2018</a:t>
             </a:fld>
             <a:endParaRPr lang="en-US"/>
           </a:p>
@@ -3985,7 +3985,7 @@
           <a:p>
             <a:fld id="{E195784C-ED5D-4D15-9B37-003B1F3BD18D}" type="datetime1">
               <a:rPr lang="fr-FR" smtClean="0"/>
-              <a:t>27/09/2018</a:t>
+              <a:t>04/10/2018</a:t>
             </a:fld>
             <a:endParaRPr lang="en-US"/>
           </a:p>
@@ -4288,7 +4288,7 @@
           <a:p>
             <a:fld id="{CF6B28D1-E542-418B-A65D-521FAA274305}" type="datetime1">
               <a:rPr lang="fr-FR" smtClean="0"/>
-              <a:t>27/09/2018</a:t>
+              <a:t>04/10/2018</a:t>
             </a:fld>
             <a:endParaRPr lang="en-US"/>
           </a:p>
@@ -4958,7 +4958,7 @@
           <a:p>
             <a:fld id="{28B2DD8D-F144-4509-91AD-1086881BD28E}" type="datetime1">
               <a:rPr lang="fr-FR" smtClean="0"/>
-              <a:t>27/09/2018</a:t>
+              <a:t>04/10/2018</a:t>
             </a:fld>
             <a:endParaRPr lang="en-US"/>
           </a:p>
@@ -5152,8 +5152,8 @@
           </a:p>
         </p:txBody>
       </p:sp>
-      <mc:AlternateContent xmlns:mc="http://schemas.openxmlformats.org/markup-compatibility/2006">
-        <mc:Choice xmlns:a14="http://schemas.microsoft.com/office/drawing/2010/main" Requires="a14">
+      <mc:AlternateContent xmlns:mc="http://schemas.openxmlformats.org/markup-compatibility/2006" xmlns:a14="http://schemas.microsoft.com/office/drawing/2010/main">
+        <mc:Choice Requires="a14">
           <p:sp>
             <p:nvSpPr>
               <p:cNvPr id="3" name="Content Placeholder 2">
@@ -5621,7 +5621,7 @@
             </p:txBody>
           </p:sp>
         </mc:Choice>
-        <mc:Fallback>
+        <mc:Fallback xmlns="">
           <p:sp>
             <p:nvSpPr>
               <p:cNvPr id="3" name="Content Placeholder 2">
@@ -5684,7 +5684,7 @@
           <a:p>
             <a:fld id="{2719A7D8-6218-4F29-BBC1-15CABA12F608}" type="datetime1">
               <a:rPr lang="fr-FR" smtClean="0"/>
-              <a:t>27/09/2018</a:t>
+              <a:t>04/10/2018</a:t>
             </a:fld>
             <a:endParaRPr lang="en-US"/>
           </a:p>
@@ -5959,7 +5959,7 @@
           <a:p>
             <a:fld id="{56377D2C-166E-4F9D-821D-6439A843A07A}" type="datetime1">
               <a:rPr lang="fr-FR" smtClean="0"/>
-              <a:t>27/09/2018</a:t>
+              <a:t>04/10/2018</a:t>
             </a:fld>
             <a:endParaRPr lang="en-US"/>
           </a:p>
@@ -6311,7 +6311,7 @@
           <a:p>
             <a:fld id="{F1C869B1-F774-4E15-AE29-C4F5443D9443}" type="datetime1">
               <a:rPr lang="fr-FR" smtClean="0"/>
-              <a:t>27/09/2018</a:t>
+              <a:t>04/10/2018</a:t>
             </a:fld>
             <a:endParaRPr lang="en-US"/>
           </a:p>
@@ -6879,7 +6879,7 @@
           <a:p>
             <a:fld id="{6C9A2931-D3D7-48DA-B164-F829AF3C02DE}" type="datetime1">
               <a:rPr lang="fr-FR" smtClean="0"/>
-              <a:t>27/09/2018</a:t>
+              <a:t>04/10/2018</a:t>
             </a:fld>
             <a:endParaRPr lang="en-US"/>
           </a:p>
@@ -7224,7 +7224,7 @@
           <a:p>
             <a:fld id="{4FEB9DEE-7CC5-4158-B42A-F359F46219A9}" type="datetime1">
               <a:rPr lang="fr-FR" smtClean="0"/>
-              <a:t>27/09/2018</a:t>
+              <a:t>04/10/2018</a:t>
             </a:fld>
             <a:endParaRPr lang="en-US"/>
           </a:p>
@@ -7788,7 +7788,7 @@
           <a:p>
             <a:fld id="{8A1231AD-89CC-4A11-A0EA-D7425521D7CE}" type="datetime1">
               <a:rPr lang="fr-FR" smtClean="0"/>
-              <a:t>27/09/2018</a:t>
+              <a:t>04/10/2018</a:t>
             </a:fld>
             <a:endParaRPr lang="en-US"/>
           </a:p>
@@ -8963,7 +8963,7 @@
           <a:p>
             <a:fld id="{B3914519-B1E1-4A82-AB6D-04489035B796}" type="datetime1">
               <a:rPr lang="fr-FR" smtClean="0"/>
-              <a:t>27/09/2018</a:t>
+              <a:t>04/10/2018</a:t>
             </a:fld>
             <a:endParaRPr lang="en-US"/>
           </a:p>
@@ -9332,7 +9332,7 @@
           <a:p>
             <a:fld id="{582E0981-7739-4C92-9C47-545FF9EC6CA5}" type="datetime1">
               <a:rPr lang="fr-FR" smtClean="0"/>
-              <a:t>27/09/2018</a:t>
+              <a:t>04/10/2018</a:t>
             </a:fld>
             <a:endParaRPr lang="en-US"/>
           </a:p>
@@ -9755,7 +9755,7 @@
           <a:p>
             <a:fld id="{DE60F908-594B-414E-BB21-96114334D9EA}" type="datetime1">
               <a:rPr lang="fr-FR" smtClean="0"/>
-              <a:t>27/09/2018</a:t>
+              <a:t>04/10/2018</a:t>
             </a:fld>
             <a:endParaRPr lang="en-US"/>
           </a:p>
@@ -10924,7 +10924,7 @@
           <a:p>
             <a:fld id="{1BF08FDE-120A-40D9-86AB-9092B6F160A5}" type="datetime1">
               <a:rPr lang="fr-FR" smtClean="0"/>
-              <a:t>27/09/2018</a:t>
+              <a:t>04/10/2018</a:t>
             </a:fld>
             <a:endParaRPr lang="en-US"/>
           </a:p>
@@ -13081,7 +13081,7 @@
           <a:p>
             <a:fld id="{FBB63AFF-6F4A-4976-93AA-0216E94D1297}" type="datetime1">
               <a:rPr lang="fr-FR" smtClean="0"/>
-              <a:t>27/09/2018</a:t>
+              <a:t>04/10/2018</a:t>
             </a:fld>
             <a:endParaRPr lang="en-US"/>
           </a:p>
@@ -14376,7 +14376,7 @@
           <a:p>
             <a:fld id="{84CDF1D9-3A8E-4630-8BA9-EBE68DEE04CA}" type="datetime1">
               <a:rPr lang="fr-FR" smtClean="0"/>
-              <a:t>27/09/2018</a:t>
+              <a:t>04/10/2018</a:t>
             </a:fld>
             <a:endParaRPr lang="en-US"/>
           </a:p>
@@ -14659,7 +14659,7 @@
           <a:p>
             <a:fld id="{4B869F7A-A850-4975-914E-40E1D31214BA}" type="datetime1">
               <a:rPr lang="fr-FR" smtClean="0"/>
-              <a:t>27/09/2018</a:t>
+              <a:t>04/10/2018</a:t>
             </a:fld>
             <a:endParaRPr lang="en-US"/>
           </a:p>
@@ -15558,7 +15558,7 @@
             </a:pPr>
             <a:fld id="{01B2B69D-7E97-4EF6-83E9-8522D6D76049}" type="datetime1">
               <a:rPr lang="fr-FR" smtClean="0"/>
-              <a:t>27/09/2018</a:t>
+              <a:t>04/10/2018</a:t>
             </a:fld>
             <a:endParaRPr lang="en-US"/>
           </a:p>
@@ -15763,7 +15763,7 @@
           <a:p>
             <a:fld id="{9E678218-0E6D-4B42-945B-6AAEDF2A50A3}" type="datetime1">
               <a:rPr lang="fr-FR" smtClean="0"/>
-              <a:t>27/09/2018</a:t>
+              <a:t>04/10/2018</a:t>
             </a:fld>
             <a:endParaRPr lang="en-US"/>
           </a:p>
@@ -16318,7 +16318,7 @@
           <a:p>
             <a:fld id="{C85BF129-4A5C-409F-BD07-8D45D50E0FCF}" type="datetime1">
               <a:rPr lang="fr-FR" smtClean="0"/>
-              <a:t>27/09/2018</a:t>
+              <a:t>04/10/2018</a:t>
             </a:fld>
             <a:endParaRPr lang="en-US"/>
           </a:p>
@@ -16656,7 +16656,7 @@
           <a:p>
             <a:fld id="{50ED5289-804C-402B-8C8C-F52CA6E4CB4D}" type="datetime1">
               <a:rPr lang="fr-FR" smtClean="0"/>
-              <a:t>27/09/2018</a:t>
+              <a:t>04/10/2018</a:t>
             </a:fld>
             <a:endParaRPr lang="en-US"/>
           </a:p>
@@ -17015,7 +17015,7 @@
           <a:p>
             <a:fld id="{A999E88F-F81F-4ABA-AACA-294251739C1B}" type="datetime1">
               <a:rPr lang="fr-FR" smtClean="0"/>
-              <a:t>27/09/2018</a:t>
+              <a:t>04/10/2018</a:t>
             </a:fld>
             <a:endParaRPr lang="en-US"/>
           </a:p>
@@ -17355,7 +17355,7 @@
           <a:p>
             <a:fld id="{D4A3ACF3-A8B6-483D-9008-21978936BF53}" type="datetime1">
               <a:rPr lang="fr-FR" smtClean="0"/>
-              <a:t>27/09/2018</a:t>
+              <a:t>04/10/2018</a:t>
             </a:fld>
             <a:endParaRPr lang="en-US"/>
           </a:p>
@@ -18289,7 +18289,7 @@
           <a:p>
             <a:fld id="{3B609F74-F27F-468D-BD69-C4DD45653348}" type="datetime1">
               <a:rPr lang="fr-FR" smtClean="0"/>
-              <a:t>27/09/2018</a:t>
+              <a:t>04/10/2018</a:t>
             </a:fld>
             <a:endParaRPr lang="en-US"/>
           </a:p>
@@ -19114,7 +19114,7 @@
           <a:p>
             <a:fld id="{FE2FF110-0F7E-48DB-9846-D16E553941DD}" type="datetime1">
               <a:rPr lang="fr-FR" smtClean="0"/>
-              <a:t>27/09/2018</a:t>
+              <a:t>04/10/2018</a:t>
             </a:fld>
             <a:endParaRPr lang="en-US"/>
           </a:p>
@@ -19417,7 +19417,7 @@
           <a:p>
             <a:fld id="{91407EBB-5A65-451F-ADDB-761634E7A8EA}" type="datetime1">
               <a:rPr lang="fr-FR" smtClean="0"/>
-              <a:t>27/09/2018</a:t>
+              <a:t>04/10/2018</a:t>
             </a:fld>
             <a:endParaRPr lang="en-US"/>
           </a:p>
@@ -21561,14 +21561,12 @@
 </file>
 
 <file path=customXml/item1.xml><?xml version="1.0" encoding="utf-8"?>
-<p:properties xmlns:p="http://schemas.microsoft.com/office/2006/metadata/properties" xmlns:xsi="http://www.w3.org/2001/XMLSchema-instance" xmlns:pc="http://schemas.microsoft.com/office/infopath/2007/PartnerControls">
-  <documentManagement>
-    <VSO_x0020_item_x0020_id xmlns="40262f94-9f35-4ac3-9a90-690165a166b7" xsi:nil="true"/>
-    <Assetid_x0020_ xmlns="40262f94-9f35-4ac3-9a90-690165a166b7" xsi:nil="true"/>
-    <Item_x0020_Details xmlns="40262f94-9f35-4ac3-9a90-690165a166b7" xsi:nil="true"/>
-    <Template_x0020_details xmlns="40262f94-9f35-4ac3-9a90-690165a166b7" xsi:nil="true"/>
-  </documentManagement>
-</p:properties>
+<?mso-contentType ?>
+<FormTemplates xmlns="http://schemas.microsoft.com/sharepoint/v3/contenttype/forms">
+  <Display>DocumentLibraryForm</Display>
+  <Edit>DocumentLibraryForm</Edit>
+  <New>DocumentLibraryForm</New>
+</FormTemplates>
 </file>
 
 <file path=customXml/item2.xml><?xml version="1.0" encoding="utf-8"?>
@@ -21753,27 +21751,20 @@
 </file>
 
 <file path=customXml/item3.xml><?xml version="1.0" encoding="utf-8"?>
-<?mso-contentType ?>
-<FormTemplates xmlns="http://schemas.microsoft.com/sharepoint/v3/contenttype/forms">
-  <Display>DocumentLibraryForm</Display>
-  <Edit>DocumentLibraryForm</Edit>
-  <New>DocumentLibraryForm</New>
-</FormTemplates>
+<p:properties xmlns:p="http://schemas.microsoft.com/office/2006/metadata/properties" xmlns:xsi="http://www.w3.org/2001/XMLSchema-instance" xmlns:pc="http://schemas.microsoft.com/office/infopath/2007/PartnerControls">
+  <documentManagement>
+    <VSO_x0020_item_x0020_id xmlns="40262f94-9f35-4ac3-9a90-690165a166b7" xsi:nil="true"/>
+    <Assetid_x0020_ xmlns="40262f94-9f35-4ac3-9a90-690165a166b7" xsi:nil="true"/>
+    <Item_x0020_Details xmlns="40262f94-9f35-4ac3-9a90-690165a166b7" xsi:nil="true"/>
+    <Template_x0020_details xmlns="40262f94-9f35-4ac3-9a90-690165a166b7" xsi:nil="true"/>
+  </documentManagement>
+</p:properties>
 </file>
 
 <file path=customXml/itemProps1.xml><?xml version="1.0" encoding="utf-8"?>
-<ds:datastoreItem xmlns:ds="http://schemas.openxmlformats.org/officeDocument/2006/customXml" ds:itemID="{DEDD01B8-816B-49B7-8C81-03AB51D87C54}">
+<ds:datastoreItem xmlns:ds="http://schemas.openxmlformats.org/officeDocument/2006/customXml" ds:itemID="{B024FD56-CE1B-42FC-9E83-BFBF160724C6}">
   <ds:schemaRefs>
-    <ds:schemaRef ds:uri="http://schemas.microsoft.com/office/2006/metadata/properties"/>
-    <ds:schemaRef ds:uri="http://purl.org/dc/terms/"/>
-    <ds:schemaRef ds:uri="http://schemas.microsoft.com/office/2006/documentManagement/types"/>
-    <ds:schemaRef ds:uri="a4f35948-e619-41b3-aa29-22878b09cfd2"/>
-    <ds:schemaRef ds:uri="http://schemas.microsoft.com/office/infopath/2007/PartnerControls"/>
-    <ds:schemaRef ds:uri="http://purl.org/dc/elements/1.1/"/>
-    <ds:schemaRef ds:uri="http://schemas.openxmlformats.org/package/2006/metadata/core-properties"/>
-    <ds:schemaRef ds:uri="40262f94-9f35-4ac3-9a90-690165a166b7"/>
-    <ds:schemaRef ds:uri="http://www.w3.org/XML/1998/namespace"/>
-    <ds:schemaRef ds:uri="http://purl.org/dc/dcmitype/"/>
+    <ds:schemaRef ds:uri="http://schemas.microsoft.com/sharepoint/v3/contenttype/forms"/>
   </ds:schemaRefs>
 </ds:datastoreItem>
 </file>
@@ -21798,9 +21789,18 @@
 </file>
 
 <file path=customXml/itemProps3.xml><?xml version="1.0" encoding="utf-8"?>
-<ds:datastoreItem xmlns:ds="http://schemas.openxmlformats.org/officeDocument/2006/customXml" ds:itemID="{B024FD56-CE1B-42FC-9E83-BFBF160724C6}">
+<ds:datastoreItem xmlns:ds="http://schemas.openxmlformats.org/officeDocument/2006/customXml" ds:itemID="{DEDD01B8-816B-49B7-8C81-03AB51D87C54}">
   <ds:schemaRefs>
-    <ds:schemaRef ds:uri="http://schemas.microsoft.com/sharepoint/v3/contenttype/forms"/>
+    <ds:schemaRef ds:uri="http://schemas.microsoft.com/office/2006/metadata/properties"/>
+    <ds:schemaRef ds:uri="http://purl.org/dc/terms/"/>
+    <ds:schemaRef ds:uri="http://schemas.microsoft.com/office/2006/documentManagement/types"/>
+    <ds:schemaRef ds:uri="a4f35948-e619-41b3-aa29-22878b09cfd2"/>
+    <ds:schemaRef ds:uri="http://schemas.microsoft.com/office/infopath/2007/PartnerControls"/>
+    <ds:schemaRef ds:uri="http://purl.org/dc/elements/1.1/"/>
+    <ds:schemaRef ds:uri="http://schemas.openxmlformats.org/package/2006/metadata/core-properties"/>
+    <ds:schemaRef ds:uri="40262f94-9f35-4ac3-9a90-690165a166b7"/>
+    <ds:schemaRef ds:uri="http://www.w3.org/XML/1998/namespace"/>
+    <ds:schemaRef ds:uri="http://purl.org/dc/dcmitype/"/>
   </ds:schemaRefs>
 </ds:datastoreItem>
 </file>
</xml_diff>